<commit_message>
Modificada animação de alteração de atributo por setter
</commit_message>
<xml_diff>
--- a/images/attributes-and-method-parameters.pptx
+++ b/images/attributes-and-method-parameters.pptx
@@ -104,6 +104,11 @@
       </a:defRPr>
     </a:lvl9pPr>
   </p:defaultTextStyle>
+  <p:extLst>
+    <p:ext uri="{EFAFB233-063F-42B5-8137-9DF3F51BA10A}">
+      <p15:sldGuideLst xmlns:p15="http://schemas.microsoft.com/office/powerpoint/2012/main"/>
+    </p:ext>
+  </p:extLst>
 </p:presentation>
 </file>
 
@@ -2919,8 +2924,8 @@
         </p:nvSpPr>
         <p:spPr>
           <a:xfrm>
-            <a:off x="24928" y="243726"/>
-            <a:ext cx="1751471" cy="2236446"/>
+            <a:off x="24928" y="368778"/>
+            <a:ext cx="1751471" cy="2117489"/>
           </a:xfrm>
           <a:prstGeom prst="rect">
             <a:avLst/>
@@ -2968,9 +2973,9 @@
         <p:grpSpPr>
           <a:xfrm>
             <a:off x="401566" y="494660"/>
-            <a:ext cx="997847" cy="525027"/>
+            <a:ext cx="997847" cy="513806"/>
             <a:chOff x="2969110" y="1172538"/>
-            <a:chExt cx="2194560" cy="1154688"/>
+            <a:chExt cx="2194560" cy="1130010"/>
           </a:xfrm>
         </p:grpSpPr>
         <p:sp>
@@ -3034,7 +3039,7 @@
           <p:spPr>
             <a:xfrm>
               <a:off x="2969110" y="1693346"/>
-              <a:ext cx="2194560" cy="633880"/>
+              <a:ext cx="2194560" cy="609202"/>
             </a:xfrm>
             <a:prstGeom prst="rect">
               <a:avLst/>
@@ -3049,10 +3054,10 @@
             <a:p>
               <a:pPr algn="ctr"/>
               <a:r>
-                <a:rPr lang="en-US" sz="1273" dirty="0" err="1"/>
+                <a:rPr lang="en-US" sz="1200" dirty="0" err="1"/>
                 <a:t>endereco</a:t>
               </a:r>
-              <a:endParaRPr lang="en-US" sz="1273" dirty="0"/>
+              <a:endParaRPr lang="en-US" sz="1200" dirty="0"/>
             </a:p>
           </p:txBody>
         </p:sp>
@@ -3065,8 +3070,8 @@
         </p:nvSpPr>
         <p:spPr>
           <a:xfrm>
-            <a:off x="533121" y="1790"/>
-            <a:ext cx="691150" cy="276999"/>
+            <a:off x="365063" y="-21658"/>
+            <a:ext cx="1027268" cy="400110"/>
           </a:xfrm>
           <a:prstGeom prst="rect">
             <a:avLst/>
@@ -3081,9 +3086,10 @@
           <a:p>
             <a:pPr algn="ctr"/>
             <a:r>
-              <a:rPr lang="en-US" sz="1200" b="1" dirty="0"/>
+              <a:rPr lang="en-US" sz="2000" b="1" smtClean="0"/>
               <a:t>cliente1</a:t>
             </a:r>
+            <a:endParaRPr lang="en-US" sz="2000" b="1" dirty="0"/>
           </a:p>
         </p:txBody>
       </p:sp>
@@ -3095,8 +3101,8 @@
         </p:nvSpPr>
         <p:spPr>
           <a:xfrm>
-            <a:off x="378266" y="1396774"/>
-            <a:ext cx="1049603" cy="288220"/>
+            <a:off x="288388" y="1291266"/>
+            <a:ext cx="1227796" cy="338554"/>
           </a:xfrm>
           <a:prstGeom prst="rect">
             <a:avLst/>
@@ -3111,10 +3117,10 @@
           <a:p>
             <a:pPr algn="ctr"/>
             <a:r>
-              <a:rPr lang="en-US" sz="1273" dirty="0" err="1"/>
+              <a:rPr lang="en-US" sz="1600" dirty="0" err="1"/>
               <a:t>setEndereco</a:t>
             </a:r>
-            <a:endParaRPr lang="en-US" sz="1273" dirty="0"/>
+            <a:endParaRPr lang="en-US" sz="1600" dirty="0"/>
           </a:p>
         </p:txBody>
       </p:sp>
@@ -3126,7 +3132,7 @@
         </p:nvSpPr>
         <p:spPr>
           <a:xfrm>
-            <a:off x="401566" y="1827271"/>
+            <a:off x="401566" y="1706130"/>
             <a:ext cx="997847" cy="283703"/>
           </a:xfrm>
           <a:prstGeom prst="rect">
@@ -3178,8 +3184,8 @@
         </p:nvSpPr>
         <p:spPr>
           <a:xfrm>
-            <a:off x="401566" y="2052352"/>
-            <a:ext cx="997847" cy="288220"/>
+            <a:off x="401566" y="1935119"/>
+            <a:ext cx="997847" cy="276999"/>
           </a:xfrm>
           <a:prstGeom prst="rect">
             <a:avLst/>
@@ -3194,10 +3200,10 @@
           <a:p>
             <a:pPr algn="ctr"/>
             <a:r>
-              <a:rPr lang="en-US" sz="1273" dirty="0" err="1"/>
+              <a:rPr lang="en-US" sz="1200" dirty="0" err="1"/>
               <a:t>endereco</a:t>
             </a:r>
-            <a:endParaRPr lang="en-US" sz="1273" dirty="0"/>
+            <a:endParaRPr lang="en-US" sz="1200" dirty="0"/>
           </a:p>
         </p:txBody>
       </p:sp>
@@ -3209,7 +3215,7 @@
         </p:nvSpPr>
         <p:spPr>
           <a:xfrm>
-            <a:off x="82061" y="1596221"/>
+            <a:off x="82061" y="1475080"/>
             <a:ext cx="1650429" cy="764994"/>
           </a:xfrm>
           <a:prstGeom prst="bracketPair">
@@ -3254,7 +3260,7 @@
         </p:nvSpPr>
         <p:spPr>
           <a:xfrm>
-            <a:off x="590141" y="1840263"/>
+            <a:off x="590141" y="1719127"/>
             <a:ext cx="620684" cy="260199"/>
           </a:xfrm>
           <a:prstGeom prst="rect">
@@ -3332,8 +3338,8 @@
         </p:nvSpPr>
         <p:spPr>
           <a:xfrm rot="16200000">
-            <a:off x="794673" y="1180146"/>
-            <a:ext cx="1440512" cy="216303"/>
+            <a:off x="859151" y="1115669"/>
+            <a:ext cx="1311558" cy="216303"/>
           </a:xfrm>
           <a:prstGeom prst="curvedUpArrow">
             <a:avLst/>

</xml_diff>

<commit_message>
Atualizada animação de setter
</commit_message>
<xml_diff>
--- a/images/attributes-and-method-parameters.pptx
+++ b/images/attributes-and-method-parameters.pptx
@@ -3260,8 +3260,8 @@
         </p:nvSpPr>
         <p:spPr>
           <a:xfrm>
-            <a:off x="590141" y="1719127"/>
-            <a:ext cx="620684" cy="260199"/>
+            <a:off x="503582" y="1719127"/>
+            <a:ext cx="793808" cy="260199"/>
           </a:xfrm>
           <a:prstGeom prst="rect">
             <a:avLst/>
@@ -3276,12 +3276,20 @@
           <a:p>
             <a:pPr algn="ctr"/>
             <a:r>
-              <a:rPr lang="en-US" sz="1091" dirty="0" err="1">
+              <a:rPr lang="en-US" sz="1091" dirty="0" err="1" smtClean="0">
                 <a:solidFill>
                   <a:schemeClr val="accent1"/>
                 </a:solidFill>
               </a:rPr>
-              <a:t>Manoel</a:t>
+              <a:t>Avenida</a:t>
+            </a:r>
+            <a:r>
+              <a:rPr lang="en-US" sz="1091" dirty="0" smtClean="0">
+                <a:solidFill>
+                  <a:schemeClr val="accent1"/>
+                </a:solidFill>
+              </a:rPr>
+              <a:t> JK</a:t>
             </a:r>
             <a:endParaRPr lang="en-US" sz="1091" dirty="0">
               <a:solidFill>
@@ -3299,8 +3307,8 @@
         </p:nvSpPr>
         <p:spPr>
           <a:xfrm>
-            <a:off x="590141" y="505714"/>
-            <a:ext cx="620684" cy="260199"/>
+            <a:off x="503581" y="505714"/>
+            <a:ext cx="793807" cy="260199"/>
           </a:xfrm>
           <a:prstGeom prst="rect">
             <a:avLst/>
@@ -3315,12 +3323,20 @@
           <a:p>
             <a:pPr algn="ctr"/>
             <a:r>
-              <a:rPr lang="en-US" sz="1091" dirty="0" err="1">
+              <a:rPr lang="en-US" sz="1091" dirty="0" err="1" smtClean="0">
                 <a:solidFill>
                   <a:schemeClr val="accent1"/>
                 </a:solidFill>
               </a:rPr>
-              <a:t>Manoel</a:t>
+              <a:t>Avenida</a:t>
+            </a:r>
+            <a:r>
+              <a:rPr lang="en-US" sz="1091" dirty="0" smtClean="0">
+                <a:solidFill>
+                  <a:schemeClr val="accent1"/>
+                </a:solidFill>
+              </a:rPr>
+              <a:t> JK</a:t>
             </a:r>
             <a:endParaRPr lang="en-US" sz="1091" dirty="0">
               <a:solidFill>
@@ -3558,7 +3574,7 @@
                         <p:par>
                           <p:cTn id="12" fill="hold">
                             <p:stCondLst>
-                              <p:cond delay="1750"/>
+                              <p:cond delay="1900"/>
                             </p:stCondLst>
                             <p:childTnLst>
                               <p:par>
@@ -3602,7 +3618,7 @@
                         <p:par>
                           <p:cTn id="16" fill="hold">
                             <p:stCondLst>
-                              <p:cond delay="2750"/>
+                              <p:cond delay="2900"/>
                             </p:stCondLst>
                             <p:childTnLst>
                               <p:par>
@@ -3780,7 +3796,7 @@
                         <p:par>
                           <p:cTn id="24" fill="hold">
                             <p:stCondLst>
-                              <p:cond delay="3500"/>
+                              <p:cond delay="3800"/>
                             </p:stCondLst>
                             <p:childTnLst>
                               <p:par>

</xml_diff>